<commit_message>
Analisis de sensibilidad parametrica
Se le agrego el analisis de sensibilidad parametrica, por medio de una funcion que incluyera un ciclo FOR.
Se le tiene que hacer cambios manuales, al momento de escoger el parametro, de ahi en fuera se generaron las graficas del cambio y se guardaron sus bases de datos
</commit_message>
<xml_diff>
--- a/Escrito de tesis/images/Chagas_03dic.pptx
+++ b/Escrito de tesis/images/Chagas_03dic.pptx
@@ -6,6 +6,8 @@
   </p:sldMasterIdLst>
   <p:sldIdLst>
     <p:sldId id="256" r:id="rId2"/>
+    <p:sldId id="258" r:id="rId3"/>
+    <p:sldId id="257" r:id="rId4"/>
   </p:sldIdLst>
   <p:sldSz cx="12192000" cy="6858000"/>
   <p:notesSz cx="6858000" cy="9144000"/>
@@ -261,7 +263,7 @@
           <a:p>
             <a:fld id="{330ED124-75CD-4E37-A87C-BE2FE6CBEF12}" type="datetimeFigureOut">
               <a:rPr lang="es-MX" smtClean="0"/>
-              <a:t>20/01/2025</a:t>
+              <a:t>24/03/2025</a:t>
             </a:fld>
             <a:endParaRPr lang="es-MX"/>
           </a:p>
@@ -461,7 +463,7 @@
           <a:p>
             <a:fld id="{330ED124-75CD-4E37-A87C-BE2FE6CBEF12}" type="datetimeFigureOut">
               <a:rPr lang="es-MX" smtClean="0"/>
-              <a:t>20/01/2025</a:t>
+              <a:t>24/03/2025</a:t>
             </a:fld>
             <a:endParaRPr lang="es-MX"/>
           </a:p>
@@ -671,7 +673,7 @@
           <a:p>
             <a:fld id="{330ED124-75CD-4E37-A87C-BE2FE6CBEF12}" type="datetimeFigureOut">
               <a:rPr lang="es-MX" smtClean="0"/>
-              <a:t>20/01/2025</a:t>
+              <a:t>24/03/2025</a:t>
             </a:fld>
             <a:endParaRPr lang="es-MX"/>
           </a:p>
@@ -871,7 +873,7 @@
           <a:p>
             <a:fld id="{330ED124-75CD-4E37-A87C-BE2FE6CBEF12}" type="datetimeFigureOut">
               <a:rPr lang="es-MX" smtClean="0"/>
-              <a:t>20/01/2025</a:t>
+              <a:t>24/03/2025</a:t>
             </a:fld>
             <a:endParaRPr lang="es-MX"/>
           </a:p>
@@ -1147,7 +1149,7 @@
           <a:p>
             <a:fld id="{330ED124-75CD-4E37-A87C-BE2FE6CBEF12}" type="datetimeFigureOut">
               <a:rPr lang="es-MX" smtClean="0"/>
-              <a:t>20/01/2025</a:t>
+              <a:t>24/03/2025</a:t>
             </a:fld>
             <a:endParaRPr lang="es-MX"/>
           </a:p>
@@ -1415,7 +1417,7 @@
           <a:p>
             <a:fld id="{330ED124-75CD-4E37-A87C-BE2FE6CBEF12}" type="datetimeFigureOut">
               <a:rPr lang="es-MX" smtClean="0"/>
-              <a:t>20/01/2025</a:t>
+              <a:t>24/03/2025</a:t>
             </a:fld>
             <a:endParaRPr lang="es-MX"/>
           </a:p>
@@ -1830,7 +1832,7 @@
           <a:p>
             <a:fld id="{330ED124-75CD-4E37-A87C-BE2FE6CBEF12}" type="datetimeFigureOut">
               <a:rPr lang="es-MX" smtClean="0"/>
-              <a:t>20/01/2025</a:t>
+              <a:t>24/03/2025</a:t>
             </a:fld>
             <a:endParaRPr lang="es-MX"/>
           </a:p>
@@ -1972,7 +1974,7 @@
           <a:p>
             <a:fld id="{330ED124-75CD-4E37-A87C-BE2FE6CBEF12}" type="datetimeFigureOut">
               <a:rPr lang="es-MX" smtClean="0"/>
-              <a:t>20/01/2025</a:t>
+              <a:t>24/03/2025</a:t>
             </a:fld>
             <a:endParaRPr lang="es-MX"/>
           </a:p>
@@ -2085,7 +2087,7 @@
           <a:p>
             <a:fld id="{330ED124-75CD-4E37-A87C-BE2FE6CBEF12}" type="datetimeFigureOut">
               <a:rPr lang="es-MX" smtClean="0"/>
-              <a:t>20/01/2025</a:t>
+              <a:t>24/03/2025</a:t>
             </a:fld>
             <a:endParaRPr lang="es-MX"/>
           </a:p>
@@ -2398,7 +2400,7 @@
           <a:p>
             <a:fld id="{330ED124-75CD-4E37-A87C-BE2FE6CBEF12}" type="datetimeFigureOut">
               <a:rPr lang="es-MX" smtClean="0"/>
-              <a:t>20/01/2025</a:t>
+              <a:t>24/03/2025</a:t>
             </a:fld>
             <a:endParaRPr lang="es-MX"/>
           </a:p>
@@ -2687,7 +2689,7 @@
           <a:p>
             <a:fld id="{330ED124-75CD-4E37-A87C-BE2FE6CBEF12}" type="datetimeFigureOut">
               <a:rPr lang="es-MX" smtClean="0"/>
-              <a:t>20/01/2025</a:t>
+              <a:t>24/03/2025</a:t>
             </a:fld>
             <a:endParaRPr lang="es-MX"/>
           </a:p>
@@ -2930,7 +2932,7 @@
           <a:p>
             <a:fld id="{330ED124-75CD-4E37-A87C-BE2FE6CBEF12}" type="datetimeFigureOut">
               <a:rPr lang="es-MX" smtClean="0"/>
-              <a:t>20/01/2025</a:t>
+              <a:t>24/03/2025</a:t>
             </a:fld>
             <a:endParaRPr lang="es-MX"/>
           </a:p>
@@ -5394,10 +5396,422 @@
           </a:p>
         </p:txBody>
       </p:sp>
+      <p:pic>
+        <p:nvPicPr>
+          <p:cNvPr id="3" name="Imagen 2">
+            <a:extLst>
+              <a:ext uri="{FF2B5EF4-FFF2-40B4-BE49-F238E27FC236}">
+                <a16:creationId xmlns:a16="http://schemas.microsoft.com/office/drawing/2014/main" id="{A465AF5F-76E8-B89D-0F71-200ADE4CDD9E}"/>
+              </a:ext>
+            </a:extLst>
+          </p:cNvPr>
+          <p:cNvPicPr>
+            <a:picLocks noChangeAspect="1"/>
+          </p:cNvPicPr>
+          <p:nvPr/>
+        </p:nvPicPr>
+        <p:blipFill rotWithShape="1">
+          <a:blip r:embed="rId2">
+            <a:extLst>
+              <a:ext uri="{28A0092B-C50C-407E-A947-70E740481C1C}">
+                <a14:useLocalDpi xmlns:a14="http://schemas.microsoft.com/office/drawing/2010/main" val="0"/>
+              </a:ext>
+            </a:extLst>
+          </a:blip>
+          <a:srcRect b="6480"/>
+          <a:stretch/>
+        </p:blipFill>
+        <p:spPr>
+          <a:xfrm>
+            <a:off x="1024197" y="152400"/>
+            <a:ext cx="10448405" cy="6839926"/>
+          </a:xfrm>
+          <a:prstGeom prst="rect">
+            <a:avLst/>
+          </a:prstGeom>
+        </p:spPr>
+      </p:pic>
     </p:spTree>
     <p:extLst>
       <p:ext uri="{BB962C8B-B14F-4D97-AF65-F5344CB8AC3E}">
         <p14:creationId xmlns:p14="http://schemas.microsoft.com/office/powerpoint/2010/main" val="3747457960"/>
+      </p:ext>
+    </p:extLst>
+  </p:cSld>
+  <p:clrMapOvr>
+    <a:masterClrMapping/>
+  </p:clrMapOvr>
+</p:sld>
+</file>
+
+<file path=ppt/slides/slide2.xml><?xml version="1.0" encoding="utf-8"?>
+<p:sld xmlns:a="http://schemas.openxmlformats.org/drawingml/2006/main" xmlns:r="http://schemas.openxmlformats.org/officeDocument/2006/relationships" xmlns:p="http://schemas.openxmlformats.org/presentationml/2006/main">
+  <p:cSld>
+    <p:spTree>
+      <p:nvGrpSpPr>
+        <p:cNvPr id="1" name=""/>
+        <p:cNvGrpSpPr/>
+        <p:nvPr/>
+      </p:nvGrpSpPr>
+      <p:grpSpPr>
+        <a:xfrm>
+          <a:off x="0" y="0"/>
+          <a:ext cx="0" cy="0"/>
+          <a:chOff x="0" y="0"/>
+          <a:chExt cx="0" cy="0"/>
+        </a:xfrm>
+      </p:grpSpPr>
+      <p:pic>
+        <p:nvPicPr>
+          <p:cNvPr id="6" name="Imagen 5">
+            <a:extLst>
+              <a:ext uri="{FF2B5EF4-FFF2-40B4-BE49-F238E27FC236}">
+                <a16:creationId xmlns:a16="http://schemas.microsoft.com/office/drawing/2014/main" id="{9ED7C9A3-C343-4D14-8894-02B87773A30B}"/>
+              </a:ext>
+            </a:extLst>
+          </p:cNvPr>
+          <p:cNvPicPr>
+            <a:picLocks noChangeAspect="1"/>
+          </p:cNvPicPr>
+          <p:nvPr/>
+        </p:nvPicPr>
+        <p:blipFill>
+          <a:blip r:embed="rId2">
+            <a:extLst>
+              <a:ext uri="{28A0092B-C50C-407E-A947-70E740481C1C}">
+                <a14:useLocalDpi xmlns:a14="http://schemas.microsoft.com/office/drawing/2010/main" val="0"/>
+              </a:ext>
+            </a:extLst>
+          </a:blip>
+          <a:stretch>
+            <a:fillRect/>
+          </a:stretch>
+        </p:blipFill>
+        <p:spPr>
+          <a:xfrm>
+            <a:off x="1522958" y="227870"/>
+            <a:ext cx="9146084" cy="6402259"/>
+          </a:xfrm>
+          <a:prstGeom prst="rect">
+            <a:avLst/>
+          </a:prstGeom>
+        </p:spPr>
+      </p:pic>
+    </p:spTree>
+    <p:extLst>
+      <p:ext uri="{BB962C8B-B14F-4D97-AF65-F5344CB8AC3E}">
+        <p14:creationId xmlns:p14="http://schemas.microsoft.com/office/powerpoint/2010/main" val="1913004874"/>
+      </p:ext>
+    </p:extLst>
+  </p:cSld>
+  <p:clrMapOvr>
+    <a:masterClrMapping/>
+  </p:clrMapOvr>
+</p:sld>
+</file>
+
+<file path=ppt/slides/slide3.xml><?xml version="1.0" encoding="utf-8"?>
+<p:sld xmlns:a="http://schemas.openxmlformats.org/drawingml/2006/main" xmlns:r="http://schemas.openxmlformats.org/officeDocument/2006/relationships" xmlns:p="http://schemas.openxmlformats.org/presentationml/2006/main">
+  <p:cSld>
+    <p:spTree>
+      <p:nvGrpSpPr>
+        <p:cNvPr id="1" name=""/>
+        <p:cNvGrpSpPr/>
+        <p:nvPr/>
+      </p:nvGrpSpPr>
+      <p:grpSpPr>
+        <a:xfrm>
+          <a:off x="0" y="0"/>
+          <a:ext cx="0" cy="0"/>
+          <a:chOff x="0" y="0"/>
+          <a:chExt cx="0" cy="0"/>
+        </a:xfrm>
+      </p:grpSpPr>
+      <p:pic>
+        <p:nvPicPr>
+          <p:cNvPr id="4" name="Imagen 3">
+            <a:extLst>
+              <a:ext uri="{FF2B5EF4-FFF2-40B4-BE49-F238E27FC236}">
+                <a16:creationId xmlns:a16="http://schemas.microsoft.com/office/drawing/2014/main" id="{68E62438-41E7-2840-8154-0C99EA4D7468}"/>
+              </a:ext>
+            </a:extLst>
+          </p:cNvPr>
+          <p:cNvPicPr>
+            <a:picLocks noChangeAspect="1"/>
+          </p:cNvPicPr>
+          <p:nvPr/>
+        </p:nvPicPr>
+        <p:blipFill>
+          <a:blip r:embed="rId2">
+            <a:extLst>
+              <a:ext uri="{28A0092B-C50C-407E-A947-70E740481C1C}">
+                <a14:useLocalDpi xmlns:a14="http://schemas.microsoft.com/office/drawing/2010/main" val="0"/>
+              </a:ext>
+            </a:extLst>
+          </a:blip>
+          <a:stretch>
+            <a:fillRect/>
+          </a:stretch>
+        </p:blipFill>
+        <p:spPr>
+          <a:xfrm rot="5400000">
+            <a:off x="3027680" y="-346112"/>
+            <a:ext cx="6843432" cy="7564792"/>
+          </a:xfrm>
+          <a:prstGeom prst="rect">
+            <a:avLst/>
+          </a:prstGeom>
+        </p:spPr>
+      </p:pic>
+      <p:pic>
+        <p:nvPicPr>
+          <p:cNvPr id="47" name="Imagen 46">
+            <a:extLst>
+              <a:ext uri="{FF2B5EF4-FFF2-40B4-BE49-F238E27FC236}">
+                <a16:creationId xmlns:a16="http://schemas.microsoft.com/office/drawing/2014/main" id="{336A8842-B701-6F0A-93B9-552EFFCB980D}"/>
+              </a:ext>
+            </a:extLst>
+          </p:cNvPr>
+          <p:cNvPicPr>
+            <a:picLocks noChangeAspect="1"/>
+          </p:cNvPicPr>
+          <p:nvPr/>
+        </p:nvPicPr>
+        <p:blipFill rotWithShape="1">
+          <a:blip r:embed="rId3">
+            <a:extLst>
+              <a:ext uri="{28A0092B-C50C-407E-A947-70E740481C1C}">
+                <a14:useLocalDpi xmlns:a14="http://schemas.microsoft.com/office/drawing/2010/main" val="0"/>
+              </a:ext>
+            </a:extLst>
+          </a:blip>
+          <a:srcRect l="6053" t="22031" r="67287" b="54760"/>
+          <a:stretch/>
+        </p:blipFill>
+        <p:spPr>
+          <a:xfrm rot="5400000">
+            <a:off x="9563832" y="1648789"/>
+            <a:ext cx="981551" cy="598133"/>
+          </a:xfrm>
+          <a:prstGeom prst="rect">
+            <a:avLst/>
+          </a:prstGeom>
+        </p:spPr>
+      </p:pic>
+      <p:pic>
+        <p:nvPicPr>
+          <p:cNvPr id="48" name="Imagen 47">
+            <a:extLst>
+              <a:ext uri="{FF2B5EF4-FFF2-40B4-BE49-F238E27FC236}">
+                <a16:creationId xmlns:a16="http://schemas.microsoft.com/office/drawing/2014/main" id="{C1E5936D-457B-B5DF-EADD-E104F056034D}"/>
+              </a:ext>
+            </a:extLst>
+          </p:cNvPr>
+          <p:cNvPicPr>
+            <a:picLocks noChangeAspect="1"/>
+          </p:cNvPicPr>
+          <p:nvPr/>
+        </p:nvPicPr>
+        <p:blipFill rotWithShape="1">
+          <a:blip r:embed="rId3">
+            <a:extLst>
+              <a:ext uri="{28A0092B-C50C-407E-A947-70E740481C1C}">
+                <a14:useLocalDpi xmlns:a14="http://schemas.microsoft.com/office/drawing/2010/main" val="0"/>
+              </a:ext>
+            </a:extLst>
+          </a:blip>
+          <a:srcRect l="41772" t="29618" r="34171" b="34973"/>
+          <a:stretch/>
+        </p:blipFill>
+        <p:spPr>
+          <a:xfrm rot="5400000">
+            <a:off x="9768636" y="3620398"/>
+            <a:ext cx="864282" cy="890472"/>
+          </a:xfrm>
+          <a:prstGeom prst="rect">
+            <a:avLst/>
+          </a:prstGeom>
+        </p:spPr>
+      </p:pic>
+      <p:pic>
+        <p:nvPicPr>
+          <p:cNvPr id="50" name="Imagen 49">
+            <a:extLst>
+              <a:ext uri="{FF2B5EF4-FFF2-40B4-BE49-F238E27FC236}">
+                <a16:creationId xmlns:a16="http://schemas.microsoft.com/office/drawing/2014/main" id="{A949F87C-D958-0700-2991-BD86659E64D3}"/>
+              </a:ext>
+            </a:extLst>
+          </p:cNvPr>
+          <p:cNvPicPr>
+            <a:picLocks noChangeAspect="1"/>
+          </p:cNvPicPr>
+          <p:nvPr/>
+        </p:nvPicPr>
+        <p:blipFill rotWithShape="1">
+          <a:blip r:embed="rId3">
+            <a:extLst>
+              <a:ext uri="{28A0092B-C50C-407E-A947-70E740481C1C}">
+                <a14:useLocalDpi xmlns:a14="http://schemas.microsoft.com/office/drawing/2010/main" val="0"/>
+              </a:ext>
+            </a:extLst>
+          </a:blip>
+          <a:srcRect l="57810" t="7450" r="12509" b="78714"/>
+          <a:stretch/>
+        </p:blipFill>
+        <p:spPr>
+          <a:xfrm rot="5400000">
+            <a:off x="9550152" y="6262044"/>
+            <a:ext cx="898665" cy="293248"/>
+          </a:xfrm>
+          <a:prstGeom prst="rect">
+            <a:avLst/>
+          </a:prstGeom>
+        </p:spPr>
+      </p:pic>
+      <p:pic>
+        <p:nvPicPr>
+          <p:cNvPr id="51" name="Imagen 50">
+            <a:extLst>
+              <a:ext uri="{FF2B5EF4-FFF2-40B4-BE49-F238E27FC236}">
+                <a16:creationId xmlns:a16="http://schemas.microsoft.com/office/drawing/2014/main" id="{33D212DA-60EA-1FE4-1625-212F1312B9FE}"/>
+              </a:ext>
+            </a:extLst>
+          </p:cNvPr>
+          <p:cNvPicPr>
+            <a:picLocks noChangeAspect="1"/>
+          </p:cNvPicPr>
+          <p:nvPr/>
+        </p:nvPicPr>
+        <p:blipFill rotWithShape="1">
+          <a:blip r:embed="rId3">
+            <a:extLst>
+              <a:ext uri="{28A0092B-C50C-407E-A947-70E740481C1C}">
+                <a14:useLocalDpi xmlns:a14="http://schemas.microsoft.com/office/drawing/2010/main" val="0"/>
+              </a:ext>
+            </a:extLst>
+          </a:blip>
+          <a:srcRect l="2615" t="59670" r="69995" b="2095"/>
+          <a:stretch/>
+        </p:blipFill>
+        <p:spPr>
+          <a:xfrm rot="5400000">
+            <a:off x="7223458" y="1467079"/>
+            <a:ext cx="876545" cy="856548"/>
+          </a:xfrm>
+          <a:prstGeom prst="rect">
+            <a:avLst/>
+          </a:prstGeom>
+        </p:spPr>
+      </p:pic>
+      <p:pic>
+        <p:nvPicPr>
+          <p:cNvPr id="52" name="Imagen 51">
+            <a:extLst>
+              <a:ext uri="{FF2B5EF4-FFF2-40B4-BE49-F238E27FC236}">
+                <a16:creationId xmlns:a16="http://schemas.microsoft.com/office/drawing/2014/main" id="{DC219D05-34C1-2028-A91D-0A1E158636E9}"/>
+              </a:ext>
+            </a:extLst>
+          </p:cNvPr>
+          <p:cNvPicPr>
+            <a:picLocks noChangeAspect="1"/>
+          </p:cNvPicPr>
+          <p:nvPr/>
+        </p:nvPicPr>
+        <p:blipFill rotWithShape="1">
+          <a:blip r:embed="rId3">
+            <a:extLst>
+              <a:ext uri="{28A0092B-C50C-407E-A947-70E740481C1C}">
+                <a14:useLocalDpi xmlns:a14="http://schemas.microsoft.com/office/drawing/2010/main" val="0"/>
+              </a:ext>
+            </a:extLst>
+          </a:blip>
+          <a:srcRect l="34587" t="74994" r="27297" b="8641"/>
+          <a:stretch/>
+        </p:blipFill>
+        <p:spPr>
+          <a:xfrm rot="5400000">
+            <a:off x="6932717" y="4163090"/>
+            <a:ext cx="1106441" cy="332537"/>
+          </a:xfrm>
+          <a:prstGeom prst="rect">
+            <a:avLst/>
+          </a:prstGeom>
+        </p:spPr>
+      </p:pic>
+      <p:pic>
+        <p:nvPicPr>
+          <p:cNvPr id="53" name="Imagen 52">
+            <a:extLst>
+              <a:ext uri="{FF2B5EF4-FFF2-40B4-BE49-F238E27FC236}">
+                <a16:creationId xmlns:a16="http://schemas.microsoft.com/office/drawing/2014/main" id="{92CB84A0-00BD-7ED4-A92E-B9CEE81F5774}"/>
+              </a:ext>
+            </a:extLst>
+          </p:cNvPr>
+          <p:cNvPicPr>
+            <a:picLocks noChangeAspect="1"/>
+          </p:cNvPicPr>
+          <p:nvPr/>
+        </p:nvPicPr>
+        <p:blipFill rotWithShape="1">
+          <a:blip r:embed="rId3">
+            <a:extLst>
+              <a:ext uri="{28A0092B-C50C-407E-A947-70E740481C1C}">
+                <a14:useLocalDpi xmlns:a14="http://schemas.microsoft.com/office/drawing/2010/main" val="0"/>
+              </a:ext>
+            </a:extLst>
+          </a:blip>
+          <a:srcRect l="78431" t="36908" b="34531"/>
+          <a:stretch/>
+        </p:blipFill>
+        <p:spPr>
+          <a:xfrm>
+            <a:off x="7232618" y="6086409"/>
+            <a:ext cx="695326" cy="644518"/>
+          </a:xfrm>
+          <a:prstGeom prst="rect">
+            <a:avLst/>
+          </a:prstGeom>
+        </p:spPr>
+      </p:pic>
+      <p:pic>
+        <p:nvPicPr>
+          <p:cNvPr id="54" name="Imagen 53">
+            <a:extLst>
+              <a:ext uri="{FF2B5EF4-FFF2-40B4-BE49-F238E27FC236}">
+                <a16:creationId xmlns:a16="http://schemas.microsoft.com/office/drawing/2014/main" id="{0780D134-6B45-6125-B20A-6129971DEBF0}"/>
+              </a:ext>
+            </a:extLst>
+          </p:cNvPr>
+          <p:cNvPicPr>
+            <a:picLocks noChangeAspect="1"/>
+          </p:cNvPicPr>
+          <p:nvPr/>
+        </p:nvPicPr>
+        <p:blipFill rotWithShape="1">
+          <a:blip r:embed="rId3">
+            <a:extLst>
+              <a:ext uri="{28A0092B-C50C-407E-A947-70E740481C1C}">
+                <a14:useLocalDpi xmlns:a14="http://schemas.microsoft.com/office/drawing/2010/main" val="0"/>
+              </a:ext>
+            </a:extLst>
+          </a:blip>
+          <a:srcRect l="78744" t="65469" b="6112"/>
+          <a:stretch/>
+        </p:blipFill>
+        <p:spPr>
+          <a:xfrm>
+            <a:off x="4745320" y="1771831"/>
+            <a:ext cx="722030" cy="675742"/>
+          </a:xfrm>
+          <a:prstGeom prst="rect">
+            <a:avLst/>
+          </a:prstGeom>
+        </p:spPr>
+      </p:pic>
+    </p:spTree>
+    <p:extLst>
+      <p:ext uri="{BB962C8B-B14F-4D97-AF65-F5344CB8AC3E}">
+        <p14:creationId xmlns:p14="http://schemas.microsoft.com/office/powerpoint/2010/main" val="1017678959"/>
       </p:ext>
     </p:extLst>
   </p:cSld>

</xml_diff>